<commit_message>
bug fixes in 03_oemof_basic_component.ipynb and updated presentation
</commit_message>
<xml_diff>
--- a/Oemof_Workshop_05_Components.pptx
+++ b/Oemof_Workshop_05_Components.pptx
@@ -130,7 +130,7 @@
   </p:defaultTextStyle>
   <p:extLst>
     <p:ext uri="{EFAFB233-063F-42B5-8137-9DF3F51BA10A}">
-      <p15:sldGuideLst xmlns="" xmlns:p15="http://schemas.microsoft.com/office/powerpoint/2012/main">
+      <p15:sldGuideLst xmlns:p15="http://schemas.microsoft.com/office/powerpoint/2012/main" xmlns="">
         <p15:guide id="1" orient="horz" pos="2160">
           <p15:clr>
             <a:srgbClr val="A4A3A4"/>
@@ -4708,7 +4708,7 @@
           <a:p>
             <a:fld id="{6BD11D3B-DADA-9042-8997-28ACE677BFD3}" type="datetimeFigureOut">
               <a:rPr lang="de-DE" smtClean="0"/>
-              <a:t>16.09.2019</a:t>
+              <a:t>17.09.2019</a:t>
             </a:fld>
             <a:endParaRPr lang="de-DE"/>
           </a:p>
@@ -14492,6 +14492,13 @@
   <p:clrMapOvr>
     <a:masterClrMapping/>
   </p:clrMapOvr>
+  <p:timing>
+    <p:tnLst>
+      <p:par>
+        <p:cTn id="1" dur="indefinite" restart="never" nodeType="tmRoot"/>
+      </p:par>
+    </p:tnLst>
+  </p:timing>
 </p:sld>
 </file>
 
@@ -15027,6 +15034,13 @@
   <p:clrMapOvr>
     <a:masterClrMapping/>
   </p:clrMapOvr>
+  <p:timing>
+    <p:tnLst>
+      <p:par>
+        <p:cTn id="1" dur="indefinite" restart="never" nodeType="tmRoot"/>
+      </p:par>
+    </p:tnLst>
+  </p:timing>
 </p:sld>
 </file>
 
@@ -15521,6 +15535,13 @@
   <p:clrMapOvr>
     <a:masterClrMapping/>
   </p:clrMapOvr>
+  <p:timing>
+    <p:tnLst>
+      <p:par>
+        <p:cTn id="1" dur="indefinite" restart="never" nodeType="tmRoot"/>
+      </p:par>
+    </p:tnLst>
+  </p:timing>
 </p:sld>
 </file>
 
@@ -15643,7 +15664,7 @@
           <p:nvPr>
             <p:extLst>
               <p:ext uri="{D42A27DB-BD31-4B8C-83A1-F6EECF244321}">
-                <p14:modId xmlns:p14="http://schemas.microsoft.com/office/powerpoint/2010/main" val="1283606006"/>
+                <p14:modId xmlns:p14="http://schemas.microsoft.com/office/powerpoint/2010/main" val="814267507"/>
               </p:ext>
             </p:extLst>
           </p:nvPr>
@@ -15705,12 +15726,12 @@
                         <a:t> </a:t>
                       </a:r>
                       <a:r>
-                        <a:rPr lang="en-US" b="1" baseline="0" dirty="0" err="1" smtClean="0">
+                        <a:rPr lang="en-US" b="1" baseline="0" dirty="0" smtClean="0">
                           <a:latin typeface="Roboto Light" panose="02000000000000000000" pitchFamily="2" charset="0"/>
                           <a:ea typeface="Roboto Light" panose="02000000000000000000" pitchFamily="2" charset="0"/>
                           <a:cs typeface="Roboto Light" panose="02000000000000000000" pitchFamily="2" charset="0"/>
                         </a:rPr>
-                        <a:t>tansformers</a:t>
+                        <a:t>Transformers </a:t>
                       </a:r>
                       <a:r>
                         <a:rPr lang="en-US" b="1" baseline="0" dirty="0" smtClean="0">
@@ -15718,7 +15739,7 @@
                           <a:ea typeface="Roboto Light" panose="02000000000000000000" pitchFamily="2" charset="0"/>
                           <a:cs typeface="Roboto Light" panose="02000000000000000000" pitchFamily="2" charset="0"/>
                         </a:rPr>
-                        <a:t> with an offset</a:t>
+                        <a:t>with an offset</a:t>
                       </a:r>
                       <a:endParaRPr lang="en-GB" b="1" dirty="0">
                         <a:latin typeface="Roboto Light" panose="02000000000000000000" pitchFamily="2" charset="0"/>
@@ -16094,6 +16115,13 @@
   <p:clrMapOvr>
     <a:masterClrMapping/>
   </p:clrMapOvr>
+  <p:timing>
+    <p:tnLst>
+      <p:par>
+        <p:cTn id="1" dur="indefinite" restart="never" nodeType="tmRoot"/>
+      </p:par>
+    </p:tnLst>
+  </p:timing>
 </p:sld>
 </file>
 
@@ -16216,7 +16244,7 @@
           <p:nvPr>
             <p:extLst>
               <p:ext uri="{D42A27DB-BD31-4B8C-83A1-F6EECF244321}">
-                <p14:modId xmlns:p14="http://schemas.microsoft.com/office/powerpoint/2010/main" val="1939439248"/>
+                <p14:modId xmlns:p14="http://schemas.microsoft.com/office/powerpoint/2010/main" val="2367527009"/>
               </p:ext>
             </p:extLst>
           </p:nvPr>
@@ -16278,12 +16306,12 @@
                         <a:t> </a:t>
                       </a:r>
                       <a:r>
-                        <a:rPr lang="en-US" b="1" baseline="0" dirty="0" err="1" smtClean="0">
+                        <a:rPr lang="en-US" b="1" baseline="0" dirty="0" smtClean="0">
                           <a:latin typeface="Roboto Light" panose="02000000000000000000" pitchFamily="2" charset="0"/>
                           <a:ea typeface="Roboto Light" panose="02000000000000000000" pitchFamily="2" charset="0"/>
                           <a:cs typeface="Roboto Light" panose="02000000000000000000" pitchFamily="2" charset="0"/>
                         </a:rPr>
-                        <a:t>tansformers</a:t>
+                        <a:t>Transformers </a:t>
                       </a:r>
                       <a:r>
                         <a:rPr lang="en-US" b="1" baseline="0" dirty="0" smtClean="0">
@@ -16291,7 +16319,7 @@
                           <a:ea typeface="Roboto Light" panose="02000000000000000000" pitchFamily="2" charset="0"/>
                           <a:cs typeface="Roboto Light" panose="02000000000000000000" pitchFamily="2" charset="0"/>
                         </a:rPr>
-                        <a:t> with an offset</a:t>
+                        <a:t>with an offset</a:t>
                       </a:r>
                       <a:endParaRPr lang="en-GB" b="1" dirty="0">
                         <a:latin typeface="Roboto Light" panose="02000000000000000000" pitchFamily="2" charset="0"/>
@@ -16573,6 +16601,13 @@
   <p:clrMapOvr>
     <a:masterClrMapping/>
   </p:clrMapOvr>
+  <p:timing>
+    <p:tnLst>
+      <p:par>
+        <p:cTn id="1" dur="indefinite" restart="never" nodeType="tmRoot"/>
+      </p:par>
+    </p:tnLst>
+  </p:timing>
 </p:sld>
 </file>
 
@@ -16694,7 +16729,7 @@
         </p:nvSpPr>
         <p:spPr>
           <a:xfrm>
-            <a:off x="1001948" y="1546708"/>
+            <a:off x="1001947" y="1546708"/>
             <a:ext cx="3271737" cy="820265"/>
           </a:xfrm>
           <a:prstGeom prst="roundRect">
@@ -16752,7 +16787,7 @@
         </p:nvSpPr>
         <p:spPr>
           <a:xfrm>
-            <a:off x="1001948" y="2740866"/>
+            <a:off x="1001947" y="2688644"/>
             <a:ext cx="3271737" cy="820265"/>
           </a:xfrm>
           <a:prstGeom prst="roundRect">
@@ -16810,7 +16845,7 @@
         </p:nvSpPr>
         <p:spPr>
           <a:xfrm>
-            <a:off x="1001949" y="3970567"/>
+            <a:off x="1001947" y="4972516"/>
             <a:ext cx="3271737" cy="820265"/>
           </a:xfrm>
           <a:prstGeom prst="roundRect">
@@ -16886,12 +16921,8 @@
               <a:buNone/>
             </a:pPr>
             <a:r>
-              <a:rPr lang="en-GB" sz="2000" b="1" dirty="0"/>
-              <a:t> </a:t>
-            </a:r>
-            <a:r>
               <a:rPr lang="en-GB" sz="2000" b="1" dirty="0" smtClean="0"/>
-              <a:t>Class: </a:t>
+              <a:t>Module: </a:t>
             </a:r>
             <a:r>
               <a:rPr lang="en-GB" sz="2000" dirty="0" err="1" smtClean="0"/>
@@ -16914,11 +16945,15 @@
               <a:t>API-Documentation: </a:t>
             </a:r>
             <a:r>
-              <a:rPr lang="en-GB" sz="2000" dirty="0"/>
+              <a:rPr lang="en-GB" sz="2000" dirty="0">
+                <a:hlinkClick r:id="rId2"/>
+              </a:rPr>
               <a:t>https://</a:t>
             </a:r>
             <a:r>
-              <a:rPr lang="en-GB" sz="2000" dirty="0" smtClean="0"/>
+              <a:rPr lang="en-GB" sz="2000" dirty="0" smtClean="0">
+                <a:hlinkClick r:id="rId2"/>
+              </a:rPr>
               <a:t>oemof.readthedocs.io/en/stable/api/oemof.solph.html#module-oemof.solph.customs</a:t>
             </a:r>
             <a:endParaRPr lang="en-GB" sz="2000" dirty="0"/>
@@ -16928,6 +16963,64 @@
               <a:buNone/>
             </a:pPr>
             <a:endParaRPr lang="en-GB" sz="2000" dirty="0" smtClean="0"/>
+          </a:p>
+        </p:txBody>
+      </p:sp>
+      <p:sp>
+        <p:nvSpPr>
+          <p:cNvPr id="16" name="Abgerundetes Rechteck 15"/>
+          <p:cNvSpPr/>
+          <p:nvPr/>
+        </p:nvSpPr>
+        <p:spPr>
+          <a:xfrm>
+            <a:off x="1001947" y="3830580"/>
+            <a:ext cx="3271737" cy="820265"/>
+          </a:xfrm>
+          <a:prstGeom prst="roundRect">
+            <a:avLst/>
+          </a:prstGeom>
+          <a:solidFill>
+            <a:srgbClr val="1C2D51"/>
+          </a:solidFill>
+          <a:ln>
+            <a:noFill/>
+          </a:ln>
+        </p:spPr>
+        <p:style>
+          <a:lnRef idx="2">
+            <a:schemeClr val="accent1">
+              <a:shade val="50000"/>
+            </a:schemeClr>
+          </a:lnRef>
+          <a:fillRef idx="1">
+            <a:schemeClr val="accent1"/>
+          </a:fillRef>
+          <a:effectRef idx="0">
+            <a:schemeClr val="accent1"/>
+          </a:effectRef>
+          <a:fontRef idx="minor">
+            <a:schemeClr val="lt1"/>
+          </a:fontRef>
+        </p:style>
+        <p:txBody>
+          <a:bodyPr rtlCol="0" anchor="ctr"/>
+          <a:lstStyle/>
+          <a:p>
+            <a:pPr algn="ctr"/>
+            <a:r>
+              <a:rPr lang="en-GB" sz="2400" dirty="0" err="1" smtClean="0">
+                <a:latin typeface="Roboto Light" panose="02000000000000000000" pitchFamily="2" charset="0"/>
+                <a:ea typeface="Roboto Light" panose="02000000000000000000" pitchFamily="2" charset="0"/>
+                <a:cs typeface="Roboto Light" panose="02000000000000000000" pitchFamily="2" charset="0"/>
+              </a:rPr>
+              <a:t>ElectricalBus</a:t>
+            </a:r>
+            <a:endParaRPr lang="en-GB" sz="2400" dirty="0" smtClean="0">
+              <a:latin typeface="Roboto Light" panose="02000000000000000000" pitchFamily="2" charset="0"/>
+              <a:ea typeface="Roboto Light" panose="02000000000000000000" pitchFamily="2" charset="0"/>
+              <a:cs typeface="Roboto Light" panose="02000000000000000000" pitchFamily="2" charset="0"/>
+            </a:endParaRPr>
           </a:p>
         </p:txBody>
       </p:sp>
@@ -16941,6 +17034,13 @@
   <p:clrMapOvr>
     <a:masterClrMapping/>
   </p:clrMapOvr>
+  <p:timing>
+    <p:tnLst>
+      <p:par>
+        <p:cTn id="1" dur="indefinite" restart="never" nodeType="tmRoot"/>
+      </p:par>
+    </p:tnLst>
+  </p:timing>
 </p:sld>
 </file>
 
@@ -17063,7 +17163,7 @@
           <p:nvPr>
             <p:extLst>
               <p:ext uri="{D42A27DB-BD31-4B8C-83A1-F6EECF244321}">
-                <p14:modId xmlns:p14="http://schemas.microsoft.com/office/powerpoint/2010/main" val="3503309512"/>
+                <p14:modId xmlns:p14="http://schemas.microsoft.com/office/powerpoint/2010/main" val="1000617091"/>
               </p:ext>
             </p:extLst>
           </p:nvPr>
@@ -17352,7 +17452,23 @@
                           <a:ea typeface="Roboto Light" panose="02000000000000000000" pitchFamily="2" charset="0"/>
                           <a:cs typeface="Roboto Light" panose="02000000000000000000" pitchFamily="2" charset="0"/>
                         </a:rPr>
-                        <a:t>Transshipment_link</a:t>
+                        <a:t>Transshipment</a:t>
+                      </a:r>
+                      <a:r>
+                        <a:rPr lang="en-GB" baseline="0" dirty="0" smtClean="0">
+                          <a:latin typeface="Roboto Light" panose="02000000000000000000" pitchFamily="2" charset="0"/>
+                          <a:ea typeface="Roboto Light" panose="02000000000000000000" pitchFamily="2" charset="0"/>
+                          <a:cs typeface="Roboto Light" panose="02000000000000000000" pitchFamily="2" charset="0"/>
+                        </a:rPr>
+                        <a:t> L</a:t>
+                      </a:r>
+                      <a:r>
+                        <a:rPr lang="en-GB" dirty="0" smtClean="0">
+                          <a:latin typeface="Roboto Light" panose="02000000000000000000" pitchFamily="2" charset="0"/>
+                          <a:ea typeface="Roboto Light" panose="02000000000000000000" pitchFamily="2" charset="0"/>
+                          <a:cs typeface="Roboto Light" panose="02000000000000000000" pitchFamily="2" charset="0"/>
+                        </a:rPr>
+                        <a:t>ink</a:t>
                       </a:r>
                       <a:endParaRPr lang="en-GB" dirty="0">
                         <a:latin typeface="Roboto Light" panose="02000000000000000000" pitchFamily="2" charset="0"/>
@@ -17452,6 +17568,13 @@
   <p:clrMapOvr>
     <a:masterClrMapping/>
   </p:clrMapOvr>
+  <p:timing>
+    <p:tnLst>
+      <p:par>
+        <p:cTn id="1" dur="indefinite" restart="never" nodeType="tmRoot"/>
+      </p:par>
+    </p:tnLst>
+  </p:timing>
 </p:sld>
 </file>
 
@@ -18093,6 +18216,13 @@
   <p:clrMapOvr>
     <a:masterClrMapping/>
   </p:clrMapOvr>
+  <p:timing>
+    <p:tnLst>
+      <p:par>
+        <p:cTn id="1" dur="indefinite" restart="never" nodeType="tmRoot"/>
+      </p:par>
+    </p:tnLst>
+  </p:timing>
 </p:sld>
 </file>
 
@@ -18563,6 +18693,13 @@
   <p:clrMapOvr>
     <a:masterClrMapping/>
   </p:clrMapOvr>
+  <p:timing>
+    <p:tnLst>
+      <p:par>
+        <p:cTn id="1" dur="indefinite" restart="never" nodeType="tmRoot"/>
+      </p:par>
+    </p:tnLst>
+  </p:timing>
 </p:sld>
 </file>
 
@@ -18685,7 +18822,7 @@
           <p:nvPr>
             <p:extLst>
               <p:ext uri="{D42A27DB-BD31-4B8C-83A1-F6EECF244321}">
-                <p14:modId xmlns:p14="http://schemas.microsoft.com/office/powerpoint/2010/main" val="3259245551"/>
+                <p14:modId xmlns:p14="http://schemas.microsoft.com/office/powerpoint/2010/main" val="3628292664"/>
               </p:ext>
             </p:extLst>
           </p:nvPr>
@@ -18747,12 +18884,12 @@
                         <a:t> model a </a:t>
                       </a:r>
                       <a:r>
-                        <a:rPr lang="en-US" b="1" baseline="0" dirty="0" err="1" smtClean="0">
+                        <a:rPr lang="en-US" b="1" baseline="0" dirty="0" smtClean="0">
                           <a:latin typeface="Roboto Light" panose="02000000000000000000" pitchFamily="2" charset="0"/>
                           <a:ea typeface="Roboto Light" panose="02000000000000000000" pitchFamily="2" charset="0"/>
                           <a:cs typeface="Roboto Light" panose="02000000000000000000" pitchFamily="2" charset="0"/>
                         </a:rPr>
-                        <a:t>arvitrary</a:t>
+                        <a:t>arbitrary </a:t>
                       </a:r>
                       <a:r>
                         <a:rPr lang="en-US" b="1" baseline="0" dirty="0" smtClean="0">
@@ -18760,7 +18897,7 @@
                           <a:ea typeface="Roboto Light" panose="02000000000000000000" pitchFamily="2" charset="0"/>
                           <a:cs typeface="Roboto Light" panose="02000000000000000000" pitchFamily="2" charset="0"/>
                         </a:rPr>
-                        <a:t> compressed air energy storage</a:t>
+                        <a:t>compressed air energy storage</a:t>
                       </a:r>
                       <a:endParaRPr lang="en-GB" b="1" dirty="0">
                         <a:latin typeface="Roboto Light" panose="02000000000000000000" pitchFamily="2" charset="0"/>
@@ -19248,6 +19385,13 @@
   <p:clrMapOvr>
     <a:masterClrMapping/>
   </p:clrMapOvr>
+  <p:timing>
+    <p:tnLst>
+      <p:par>
+        <p:cTn id="1" dur="indefinite" restart="never" nodeType="tmRoot"/>
+      </p:par>
+    </p:tnLst>
+  </p:timing>
 </p:sld>
 </file>
 
@@ -19523,7 +19667,7 @@
         <p:spPr/>
         <p:txBody>
           <a:bodyPr>
-            <a:normAutofit fontScale="85000" lnSpcReduction="20000"/>
+            <a:normAutofit fontScale="62500" lnSpcReduction="20000"/>
           </a:bodyPr>
           <a:lstStyle/>
           <a:p>
@@ -19554,16 +19698,65 @@
             </a:r>
             <a:r>
               <a:rPr lang="en-US" dirty="0" smtClean="0"/>
-              <a:t>access, provide </a:t>
+              <a:t>access; </a:t>
+            </a:r>
+            <a:r>
+              <a:rPr lang="en-US" dirty="0" smtClean="0"/>
+              <a:t>provide </a:t>
+            </a:r>
+            <a:r>
+              <a:rPr lang="en-US" dirty="0" smtClean="0"/>
+              <a:t>interface </a:t>
             </a:r>
             <a:r>
               <a:rPr lang="en-US" dirty="0"/>
-              <a:t>an interface to tabular data sources from that models can be created </a:t>
+              <a:t>to tabular data sources </a:t>
             </a:r>
             <a:r>
               <a:rPr lang="en-US" dirty="0" smtClean="0"/>
-              <a:t>easily. Map facade to energy systems.</a:t>
-            </a:r>
+              <a:t>that </a:t>
+            </a:r>
+            <a:r>
+              <a:rPr lang="en-US" dirty="0"/>
+              <a:t>models can be created </a:t>
+            </a:r>
+            <a:r>
+              <a:rPr lang="en-US" dirty="0" smtClean="0"/>
+              <a:t>easily. Map </a:t>
+            </a:r>
+            <a:r>
+              <a:rPr lang="en-US" dirty="0" smtClean="0"/>
+              <a:t>technology specific parameterization</a:t>
+            </a:r>
+            <a:r>
+              <a:rPr lang="en-US" dirty="0" smtClean="0"/>
+              <a:t> </a:t>
+            </a:r>
+            <a:r>
+              <a:rPr lang="en-US" dirty="0" smtClean="0"/>
+              <a:t>to energy </a:t>
+            </a:r>
+            <a:r>
+              <a:rPr lang="en-US" dirty="0" smtClean="0"/>
+              <a:t>system model principles in </a:t>
+            </a:r>
+            <a:r>
+              <a:rPr lang="en-US" dirty="0" err="1" smtClean="0"/>
+              <a:t>oemof.solph</a:t>
+            </a:r>
+            <a:r>
+              <a:rPr lang="en-US" dirty="0" smtClean="0"/>
+              <a:t> using </a:t>
+            </a:r>
+            <a:r>
+              <a:rPr lang="en-US" dirty="0" err="1" smtClean="0"/>
+              <a:t>oemof.tabular.facades</a:t>
+            </a:r>
+            <a:r>
+              <a:rPr lang="en-US" dirty="0" smtClean="0"/>
+              <a:t> .</a:t>
+            </a:r>
+            <a:endParaRPr lang="en-US" dirty="0" smtClean="0"/>
           </a:p>
           <a:p>
             <a:pPr marL="0" indent="0">
@@ -19681,7 +19874,11 @@
             </a:pPr>
             <a:r>
               <a:rPr lang="en-GB" b="1" u="sng" dirty="0" smtClean="0"/>
-              <a:t>(planned) Project: </a:t>
+              <a:t>Project</a:t>
+            </a:r>
+            <a:r>
+              <a:rPr lang="en-GB" b="1" u="sng" dirty="0" smtClean="0"/>
+              <a:t>: </a:t>
             </a:r>
             <a:r>
               <a:rPr lang="en-GB" b="1" u="sng" dirty="0" err="1" smtClean="0"/>
@@ -19693,6 +19890,18 @@
             <a:pPr marL="0" indent="0">
               <a:buNone/>
             </a:pPr>
+            <a:r>
+              <a:rPr lang="en-GB" dirty="0" smtClean="0"/>
+              <a:t>Non-linear Transformer, </a:t>
+            </a:r>
+            <a:r>
+              <a:rPr lang="en-GB" dirty="0" err="1" smtClean="0"/>
+              <a:t>Timestep</a:t>
+            </a:r>
+            <a:r>
+              <a:rPr lang="en-GB" dirty="0" smtClean="0"/>
+              <a:t> approach rather than Perfect Foresight.</a:t>
+            </a:r>
             <a:endParaRPr lang="en-GB" dirty="0"/>
           </a:p>
           <a:p>
@@ -19742,6 +19951,13 @@
   <p:clrMapOvr>
     <a:masterClrMapping/>
   </p:clrMapOvr>
+  <p:timing>
+    <p:tnLst>
+      <p:par>
+        <p:cTn id="1" dur="indefinite" restart="never" nodeType="tmRoot"/>
+      </p:par>
+    </p:tnLst>
+  </p:timing>
 </p:sld>
 </file>
 
@@ -19908,6 +20124,13 @@
   <p:clrMapOvr>
     <a:masterClrMapping/>
   </p:clrMapOvr>
+  <p:timing>
+    <p:tnLst>
+      <p:par>
+        <p:cTn id="1" dur="indefinite" restart="never" nodeType="tmRoot"/>
+      </p:par>
+    </p:tnLst>
+  </p:timing>
 </p:sld>
 </file>
 
@@ -20716,18 +20939,7 @@
                 <a:ea typeface="Roboto Light" panose="02000000000000000000" pitchFamily="2" charset="0"/>
                 <a:cs typeface="Roboto Light" panose="02000000000000000000" pitchFamily="2" charset="0"/>
               </a:rPr>
-              <a:t>Please quote as: </a:t>
-            </a:r>
-            <a:r>
-              <a:rPr lang="en-GB" sz="1400" dirty="0" smtClean="0">
-                <a:solidFill>
-                  <a:srgbClr val="1C2D51"/>
-                </a:solidFill>
-                <a:latin typeface="Roboto Light" panose="02000000000000000000" pitchFamily="2" charset="0"/>
-                <a:ea typeface="Roboto Light" panose="02000000000000000000" pitchFamily="2" charset="0"/>
-                <a:cs typeface="Roboto Light" panose="02000000000000000000" pitchFamily="2" charset="0"/>
-              </a:rPr>
-              <a:t>“</a:t>
+              <a:t>Please quote as: “</a:t>
             </a:r>
             <a:r>
               <a:rPr lang="en-GB" sz="1400" dirty="0" err="1" smtClean="0">
@@ -20875,31 +21087,15 @@
             </a:r>
             <a:r>
               <a:rPr lang="en-US" dirty="0" smtClean="0"/>
-              <a:t>an </a:t>
+              <a:t>an abstract representation </a:t>
+            </a:r>
+            <a:r>
+              <a:rPr lang="en-US" dirty="0"/>
+              <a:t>of a</a:t>
             </a:r>
             <a:r>
               <a:rPr lang="en-US" dirty="0" smtClean="0"/>
-              <a:t>abstract </a:t>
-            </a:r>
-            <a:r>
-              <a:rPr lang="en-US" dirty="0" smtClean="0"/>
-              <a:t>representation </a:t>
-            </a:r>
-            <a:r>
-              <a:rPr lang="en-US" dirty="0"/>
-              <a:t>of </a:t>
-            </a:r>
-            <a:r>
-              <a:rPr lang="en-US" dirty="0"/>
-              <a:t>a</a:t>
-            </a:r>
-            <a:r>
-              <a:rPr lang="en-US" dirty="0" smtClean="0"/>
-              <a:t> </a:t>
-            </a:r>
-            <a:r>
-              <a:rPr lang="en-US" dirty="0" smtClean="0"/>
-              <a:t>component in the </a:t>
+              <a:t> component in the </a:t>
             </a:r>
             <a:r>
               <a:rPr lang="en-US" dirty="0"/>
@@ -20977,11 +21173,7 @@
           <a:p>
             <a:r>
               <a:rPr lang="en-GB" dirty="0" smtClean="0"/>
-              <a:t>Intro: Components </a:t>
-            </a:r>
-            <a:r>
-              <a:rPr lang="en-GB" dirty="0" smtClean="0"/>
-              <a:t>(Models)</a:t>
+              <a:t>Intro: Components (Models)</a:t>
             </a:r>
             <a:endParaRPr lang="en-GB" dirty="0"/>
           </a:p>
@@ -21020,6 +21212,13 @@
   <p:clrMapOvr>
     <a:masterClrMapping/>
   </p:clrMapOvr>
+  <p:timing>
+    <p:tnLst>
+      <p:par>
+        <p:cTn id="1" dur="indefinite" restart="never" nodeType="tmRoot"/>
+      </p:par>
+    </p:tnLst>
+  </p:timing>
 </p:sld>
 </file>
 
@@ -21086,15 +21285,7 @@
                 <a:ea typeface="Roboto" panose="02000000000000000000" pitchFamily="2" charset="0"/>
                 <a:cs typeface="Roboto" panose="02000000000000000000" pitchFamily="2" charset="0"/>
               </a:rPr>
-              <a:t> </a:t>
-            </a:r>
-            <a:r>
-              <a:rPr lang="en-US" dirty="0" smtClean="0">
-                <a:latin typeface="Roboto" panose="02000000000000000000" pitchFamily="2" charset="0"/>
-                <a:ea typeface="Roboto" panose="02000000000000000000" pitchFamily="2" charset="0"/>
-                <a:cs typeface="Roboto" panose="02000000000000000000" pitchFamily="2" charset="0"/>
-              </a:rPr>
-              <a:t>Characteristics</a:t>
+              <a:t> Characteristics</a:t>
             </a:r>
             <a:endParaRPr lang="en-US" dirty="0">
               <a:latin typeface="Roboto" panose="02000000000000000000" pitchFamily="2" charset="0"/>
@@ -21233,7 +21424,7 @@
           <p:cNvPr id="29" name="Textfeld 28">
             <a:extLst>
               <a:ext uri="{FF2B5EF4-FFF2-40B4-BE49-F238E27FC236}">
-                <a16:creationId xmlns="" xmlns:a16="http://schemas.microsoft.com/office/drawing/2014/main" id="{9234C931-625C-459E-87E8-76E33940052E}"/>
+                <a16:creationId xmlns:a16="http://schemas.microsoft.com/office/drawing/2014/main" xmlns="" id="{9234C931-625C-459E-87E8-76E33940052E}"/>
               </a:ext>
             </a:extLst>
           </p:cNvPr>
@@ -21858,504 +22049,600 @@
           </a:p>
         </p:txBody>
       </p:sp>
-      <p:sp>
-        <p:nvSpPr>
-          <p:cNvPr id="7" name="Rechteck 6"/>
-          <p:cNvSpPr/>
+      <p:grpSp>
+        <p:nvGrpSpPr>
+          <p:cNvPr id="11" name="Gruppieren 10"/>
+          <p:cNvGrpSpPr/>
           <p:nvPr/>
-        </p:nvSpPr>
-        <p:spPr>
+        </p:nvGrpSpPr>
+        <p:grpSpPr>
           <a:xfrm>
-            <a:off x="1031132" y="3842425"/>
-            <a:ext cx="7260482" cy="1828800"/>
+            <a:off x="496110" y="3842425"/>
+            <a:ext cx="8486168" cy="2187248"/>
+            <a:chOff x="496110" y="3842425"/>
+            <a:chExt cx="8486168" cy="2187248"/>
           </a:xfrm>
-          <a:prstGeom prst="rect">
-            <a:avLst/>
-          </a:prstGeom>
-          <a:gradFill>
-            <a:gsLst>
-              <a:gs pos="0">
-                <a:schemeClr val="accent1">
-                  <a:lumMod val="50000"/>
+        </p:grpSpPr>
+        <p:sp>
+          <p:nvSpPr>
+            <p:cNvPr id="7" name="Rechteck 6"/>
+            <p:cNvSpPr/>
+            <p:nvPr/>
+          </p:nvSpPr>
+          <p:spPr>
+            <a:xfrm>
+              <a:off x="1031132" y="3842425"/>
+              <a:ext cx="7260482" cy="1828800"/>
+            </a:xfrm>
+            <a:prstGeom prst="rect">
+              <a:avLst/>
+            </a:prstGeom>
+            <a:gradFill>
+              <a:gsLst>
+                <a:gs pos="0">
+                  <a:schemeClr val="accent1">
+                    <a:lumMod val="50000"/>
+                  </a:schemeClr>
+                </a:gs>
+                <a:gs pos="100000">
+                  <a:schemeClr val="accent5">
+                    <a:lumMod val="40000"/>
+                    <a:lumOff val="60000"/>
+                  </a:schemeClr>
+                </a:gs>
+              </a:gsLst>
+              <a:lin ang="10800000" scaled="0"/>
+            </a:gradFill>
+          </p:spPr>
+          <p:style>
+            <a:lnRef idx="2">
+              <a:schemeClr val="accent1">
+                <a:shade val="50000"/>
+              </a:schemeClr>
+            </a:lnRef>
+            <a:fillRef idx="1">
+              <a:schemeClr val="accent1"/>
+            </a:fillRef>
+            <a:effectRef idx="0">
+              <a:schemeClr val="accent1"/>
+            </a:effectRef>
+            <a:fontRef idx="minor">
+              <a:schemeClr val="lt1"/>
+            </a:fontRef>
+          </p:style>
+          <p:txBody>
+            <a:bodyPr rtlCol="0" anchor="ctr"/>
+            <a:lstStyle/>
+            <a:p>
+              <a:pPr algn="ctr"/>
+              <a:endParaRPr lang="en-GB"/>
+            </a:p>
+          </p:txBody>
+        </p:sp>
+        <p:sp>
+          <p:nvSpPr>
+            <p:cNvPr id="8" name="Rechteck 7"/>
+            <p:cNvSpPr/>
+            <p:nvPr/>
+          </p:nvSpPr>
+          <p:spPr>
+            <a:xfrm>
+              <a:off x="496110" y="3978613"/>
+              <a:ext cx="1381328" cy="1566153"/>
+            </a:xfrm>
+            <a:prstGeom prst="rect">
+              <a:avLst/>
+            </a:prstGeom>
+            <a:solidFill>
+              <a:schemeClr val="bg1"/>
+            </a:solidFill>
+            <a:ln w="28575">
+              <a:solidFill>
+                <a:schemeClr val="bg1">
+                  <a:lumMod val="75000"/>
                 </a:schemeClr>
-              </a:gs>
-              <a:gs pos="100000">
-                <a:schemeClr val="accent5">
-                  <a:lumMod val="40000"/>
-                  <a:lumOff val="60000"/>
-                </a:schemeClr>
-              </a:gs>
-            </a:gsLst>
-            <a:lin ang="10800000" scaled="0"/>
-          </a:gradFill>
-        </p:spPr>
-        <p:style>
-          <a:lnRef idx="2">
-            <a:schemeClr val="accent1">
-              <a:shade val="50000"/>
-            </a:schemeClr>
-          </a:lnRef>
-          <a:fillRef idx="1">
-            <a:schemeClr val="accent1"/>
-          </a:fillRef>
-          <a:effectRef idx="0">
-            <a:schemeClr val="accent1"/>
-          </a:effectRef>
-          <a:fontRef idx="minor">
-            <a:schemeClr val="lt1"/>
-          </a:fontRef>
-        </p:style>
-        <p:txBody>
-          <a:bodyPr rtlCol="0" anchor="ctr"/>
-          <a:lstStyle/>
-          <a:p>
-            <a:pPr algn="ctr"/>
-            <a:endParaRPr lang="en-GB"/>
-          </a:p>
-        </p:txBody>
-      </p:sp>
-      <p:sp>
-        <p:nvSpPr>
-          <p:cNvPr id="8" name="Rechteck 7"/>
-          <p:cNvSpPr/>
-          <p:nvPr/>
-        </p:nvSpPr>
-        <p:spPr>
-          <a:xfrm>
-            <a:off x="496110" y="3978613"/>
-            <a:ext cx="1381328" cy="1566153"/>
-          </a:xfrm>
-          <a:prstGeom prst="rect">
-            <a:avLst/>
-          </a:prstGeom>
-          <a:solidFill>
-            <a:schemeClr val="bg1"/>
-          </a:solidFill>
-          <a:ln w="28575">
-            <a:solidFill>
-              <a:schemeClr val="bg1">
-                <a:lumMod val="75000"/>
+              </a:solidFill>
+            </a:ln>
+          </p:spPr>
+          <p:style>
+            <a:lnRef idx="2">
+              <a:schemeClr val="accent1">
+                <a:shade val="50000"/>
               </a:schemeClr>
-            </a:solidFill>
-          </a:ln>
-        </p:spPr>
-        <p:style>
-          <a:lnRef idx="2">
-            <a:schemeClr val="accent1">
-              <a:shade val="50000"/>
-            </a:schemeClr>
-          </a:lnRef>
-          <a:fillRef idx="1">
-            <a:schemeClr val="accent1"/>
-          </a:fillRef>
-          <a:effectRef idx="0">
-            <a:schemeClr val="accent1"/>
-          </a:effectRef>
-          <a:fontRef idx="minor">
-            <a:schemeClr val="lt1"/>
-          </a:fontRef>
-        </p:style>
-        <p:txBody>
-          <a:bodyPr rtlCol="0" anchor="ctr"/>
-          <a:lstStyle/>
-          <a:p>
-            <a:pPr marL="285750" indent="-285750">
-              <a:buFont typeface="Arial" panose="020B0604020202020204" pitchFamily="34" charset="0"/>
-              <a:buChar char="•"/>
-            </a:pPr>
-            <a:endParaRPr lang="en-GB" dirty="0" smtClean="0">
-              <a:solidFill>
-                <a:schemeClr val="tx1"/>
-              </a:solidFill>
-              <a:latin typeface="Roboto Light" panose="02000000000000000000" pitchFamily="2" charset="0"/>
-              <a:ea typeface="Roboto Light" panose="02000000000000000000" pitchFamily="2" charset="0"/>
-              <a:cs typeface="Roboto Light" panose="02000000000000000000" pitchFamily="2" charset="0"/>
-            </a:endParaRPr>
-          </a:p>
-          <a:p>
-            <a:pPr marL="285750" indent="-285750">
-              <a:buFont typeface="Arial" panose="020B0604020202020204" pitchFamily="34" charset="0"/>
-              <a:buChar char="•"/>
-            </a:pPr>
-            <a:r>
-              <a:rPr lang="en-GB" dirty="0" smtClean="0">
+            </a:lnRef>
+            <a:fillRef idx="1">
+              <a:schemeClr val="accent1"/>
+            </a:fillRef>
+            <a:effectRef idx="0">
+              <a:schemeClr val="accent1"/>
+            </a:effectRef>
+            <a:fontRef idx="minor">
+              <a:schemeClr val="lt1"/>
+            </a:fontRef>
+          </p:style>
+          <p:txBody>
+            <a:bodyPr rtlCol="0" anchor="ctr"/>
+            <a:lstStyle/>
+            <a:p>
+              <a:pPr marL="285750" indent="-285750">
+                <a:buFont typeface="Arial" panose="020B0604020202020204" pitchFamily="34" charset="0"/>
+                <a:buChar char="•"/>
+              </a:pPr>
+              <a:endParaRPr lang="en-GB" dirty="0" smtClean="0">
                 <a:solidFill>
                   <a:schemeClr val="tx1"/>
                 </a:solidFill>
                 <a:latin typeface="Roboto Light" panose="02000000000000000000" pitchFamily="2" charset="0"/>
                 <a:ea typeface="Roboto Light" panose="02000000000000000000" pitchFamily="2" charset="0"/>
                 <a:cs typeface="Roboto Light" panose="02000000000000000000" pitchFamily="2" charset="0"/>
-              </a:rPr>
-              <a:t>Generic</a:t>
-            </a:r>
-          </a:p>
-          <a:p>
-            <a:pPr marL="285750" indent="-285750">
-              <a:buFont typeface="Arial" panose="020B0604020202020204" pitchFamily="34" charset="0"/>
-              <a:buChar char="•"/>
-            </a:pPr>
-            <a:r>
-              <a:rPr lang="en-GB" dirty="0" smtClean="0">
+              </a:endParaRPr>
+            </a:p>
+            <a:p>
+              <a:pPr marL="285750" indent="-285750">
+                <a:buFont typeface="Arial" panose="020B0604020202020204" pitchFamily="34" charset="0"/>
+                <a:buChar char="•"/>
+              </a:pPr>
+              <a:r>
+                <a:rPr lang="en-GB" dirty="0">
+                  <a:solidFill>
+                    <a:schemeClr val="tx1"/>
+                  </a:solidFill>
+                  <a:latin typeface="Roboto Light" panose="02000000000000000000" pitchFamily="2" charset="0"/>
+                  <a:ea typeface="Roboto Light" panose="02000000000000000000" pitchFamily="2" charset="0"/>
+                  <a:cs typeface="Roboto Light" panose="02000000000000000000" pitchFamily="2" charset="0"/>
+                </a:rPr>
+                <a:t>g</a:t>
+              </a:r>
+              <a:r>
+                <a:rPr lang="en-GB" dirty="0" smtClean="0">
+                  <a:solidFill>
+                    <a:schemeClr val="tx1"/>
+                  </a:solidFill>
+                  <a:latin typeface="Roboto Light" panose="02000000000000000000" pitchFamily="2" charset="0"/>
+                  <a:ea typeface="Roboto Light" panose="02000000000000000000" pitchFamily="2" charset="0"/>
+                  <a:cs typeface="Roboto Light" panose="02000000000000000000" pitchFamily="2" charset="0"/>
+                </a:rPr>
+                <a:t>eneric</a:t>
+              </a:r>
+              <a:endParaRPr lang="en-GB" dirty="0" smtClean="0">
                 <a:solidFill>
                   <a:schemeClr val="tx1"/>
                 </a:solidFill>
                 <a:latin typeface="Roboto Light" panose="02000000000000000000" pitchFamily="2" charset="0"/>
                 <a:ea typeface="Roboto Light" panose="02000000000000000000" pitchFamily="2" charset="0"/>
                 <a:cs typeface="Roboto Light" panose="02000000000000000000" pitchFamily="2" charset="0"/>
-              </a:rPr>
-              <a:t>For developers</a:t>
-            </a:r>
-          </a:p>
-          <a:p>
-            <a:pPr marL="285750" indent="-285750">
-              <a:buFont typeface="Arial" panose="020B0604020202020204" pitchFamily="34" charset="0"/>
-              <a:buChar char="•"/>
-            </a:pPr>
-            <a:r>
-              <a:rPr lang="en-GB" dirty="0" smtClean="0">
+              </a:endParaRPr>
+            </a:p>
+            <a:p>
+              <a:pPr marL="285750" indent="-285750">
+                <a:buFont typeface="Arial" panose="020B0604020202020204" pitchFamily="34" charset="0"/>
+                <a:buChar char="•"/>
+              </a:pPr>
+              <a:r>
+                <a:rPr lang="en-GB" dirty="0" smtClean="0">
+                  <a:solidFill>
+                    <a:schemeClr val="tx1"/>
+                  </a:solidFill>
+                  <a:latin typeface="Roboto Light" panose="02000000000000000000" pitchFamily="2" charset="0"/>
+                  <a:ea typeface="Roboto Light" panose="02000000000000000000" pitchFamily="2" charset="0"/>
+                  <a:cs typeface="Roboto Light" panose="02000000000000000000" pitchFamily="2" charset="0"/>
+                </a:rPr>
+                <a:t>For developers</a:t>
+              </a:r>
+            </a:p>
+            <a:p>
+              <a:pPr marL="285750" indent="-285750">
+                <a:buFont typeface="Arial" panose="020B0604020202020204" pitchFamily="34" charset="0"/>
+                <a:buChar char="•"/>
+              </a:pPr>
+              <a:r>
+                <a:rPr lang="en-GB" dirty="0" smtClean="0">
+                  <a:solidFill>
+                    <a:schemeClr val="tx1"/>
+                  </a:solidFill>
+                  <a:latin typeface="Roboto Light" panose="02000000000000000000" pitchFamily="2" charset="0"/>
+                  <a:ea typeface="Roboto Light" panose="02000000000000000000" pitchFamily="2" charset="0"/>
+                  <a:cs typeface="Roboto Light" panose="02000000000000000000" pitchFamily="2" charset="0"/>
+                </a:rPr>
+                <a:t>Reduced to a common model concept</a:t>
+              </a:r>
+            </a:p>
+            <a:p>
+              <a:pPr marL="285750" indent="-285750" algn="ctr">
+                <a:buFont typeface="Arial" panose="020B0604020202020204" pitchFamily="34" charset="0"/>
+                <a:buChar char="•"/>
+              </a:pPr>
+              <a:endParaRPr lang="en-GB" dirty="0">
+                <a:solidFill>
+                  <a:schemeClr val="tx1"/>
+                </a:solidFill>
+              </a:endParaRPr>
+            </a:p>
+          </p:txBody>
+        </p:sp>
+        <p:sp>
+          <p:nvSpPr>
+            <p:cNvPr id="12" name="Rechteck 11"/>
+            <p:cNvSpPr/>
+            <p:nvPr/>
+          </p:nvSpPr>
+          <p:spPr>
+            <a:xfrm>
+              <a:off x="7600950" y="3973747"/>
+              <a:ext cx="1381328" cy="1566153"/>
+            </a:xfrm>
+            <a:prstGeom prst="rect">
+              <a:avLst/>
+            </a:prstGeom>
+            <a:solidFill>
+              <a:schemeClr val="bg1"/>
+            </a:solidFill>
+            <a:ln w="28575">
+              <a:solidFill>
+                <a:schemeClr val="accent1">
+                  <a:lumMod val="50000"/>
+                </a:schemeClr>
+              </a:solidFill>
+            </a:ln>
+          </p:spPr>
+          <p:style>
+            <a:lnRef idx="2">
+              <a:schemeClr val="accent1">
+                <a:shade val="50000"/>
+              </a:schemeClr>
+            </a:lnRef>
+            <a:fillRef idx="1">
+              <a:schemeClr val="accent1"/>
+            </a:fillRef>
+            <a:effectRef idx="0">
+              <a:schemeClr val="accent1"/>
+            </a:effectRef>
+            <a:fontRef idx="minor">
+              <a:schemeClr val="lt1"/>
+            </a:fontRef>
+          </p:style>
+          <p:txBody>
+            <a:bodyPr rtlCol="0" anchor="ctr"/>
+            <a:lstStyle/>
+            <a:p>
+              <a:pPr marL="285750" indent="-285750">
+                <a:buFont typeface="Arial" panose="020B0604020202020204" pitchFamily="34" charset="0"/>
+                <a:buChar char="•"/>
+              </a:pPr>
+              <a:endParaRPr lang="en-GB" dirty="0" smtClean="0">
                 <a:solidFill>
                   <a:schemeClr val="tx1"/>
                 </a:solidFill>
                 <a:latin typeface="Roboto Light" panose="02000000000000000000" pitchFamily="2" charset="0"/>
                 <a:ea typeface="Roboto Light" panose="02000000000000000000" pitchFamily="2" charset="0"/>
                 <a:cs typeface="Roboto Light" panose="02000000000000000000" pitchFamily="2" charset="0"/>
-              </a:rPr>
-              <a:t>Reduced to a common model concept</a:t>
-            </a:r>
-          </a:p>
-          <a:p>
-            <a:pPr marL="285750" indent="-285750" algn="ctr">
-              <a:buFont typeface="Arial" panose="020B0604020202020204" pitchFamily="34" charset="0"/>
-              <a:buChar char="•"/>
-            </a:pPr>
-            <a:endParaRPr lang="en-GB" dirty="0">
-              <a:solidFill>
-                <a:schemeClr val="tx1"/>
-              </a:solidFill>
-            </a:endParaRPr>
-          </a:p>
-        </p:txBody>
-      </p:sp>
-      <p:sp>
-        <p:nvSpPr>
-          <p:cNvPr id="12" name="Rechteck 11"/>
-          <p:cNvSpPr/>
-          <p:nvPr/>
-        </p:nvSpPr>
-        <p:spPr>
-          <a:xfrm>
-            <a:off x="7600950" y="3973747"/>
-            <a:ext cx="1381328" cy="1566153"/>
-          </a:xfrm>
-          <a:prstGeom prst="rect">
-            <a:avLst/>
-          </a:prstGeom>
-          <a:solidFill>
-            <a:schemeClr val="bg1"/>
-          </a:solidFill>
-          <a:ln w="28575">
+              </a:endParaRPr>
+            </a:p>
+            <a:p>
+              <a:pPr marL="285750" indent="-285750">
+                <a:buFont typeface="Arial" panose="020B0604020202020204" pitchFamily="34" charset="0"/>
+                <a:buChar char="•"/>
+              </a:pPr>
+              <a:r>
+                <a:rPr lang="en-GB" dirty="0" smtClean="0">
+                  <a:solidFill>
+                    <a:schemeClr val="tx1"/>
+                  </a:solidFill>
+                  <a:latin typeface="Roboto Light" panose="02000000000000000000" pitchFamily="2" charset="0"/>
+                  <a:ea typeface="Roboto Light" panose="02000000000000000000" pitchFamily="2" charset="0"/>
+                  <a:cs typeface="Roboto Light" panose="02000000000000000000" pitchFamily="2" charset="0"/>
+                </a:rPr>
+                <a:t>specific</a:t>
+              </a:r>
+            </a:p>
+            <a:p>
+              <a:pPr marL="285750" indent="-285750">
+                <a:buFont typeface="Arial" panose="020B0604020202020204" pitchFamily="34" charset="0"/>
+                <a:buChar char="•"/>
+              </a:pPr>
+              <a:r>
+                <a:rPr lang="en-GB" dirty="0" smtClean="0">
+                  <a:solidFill>
+                    <a:schemeClr val="tx1"/>
+                  </a:solidFill>
+                  <a:latin typeface="Roboto Light" panose="02000000000000000000" pitchFamily="2" charset="0"/>
+                  <a:ea typeface="Roboto Light" panose="02000000000000000000" pitchFamily="2" charset="0"/>
+                  <a:cs typeface="Roboto Light" panose="02000000000000000000" pitchFamily="2" charset="0"/>
+                </a:rPr>
+                <a:t>For users</a:t>
+              </a:r>
+            </a:p>
+            <a:p>
+              <a:pPr marL="285750" indent="-285750">
+                <a:buFont typeface="Arial" panose="020B0604020202020204" pitchFamily="34" charset="0"/>
+                <a:buChar char="•"/>
+              </a:pPr>
+              <a:r>
+                <a:rPr lang="en-GB" dirty="0" smtClean="0">
+                  <a:solidFill>
+                    <a:schemeClr val="tx1"/>
+                  </a:solidFill>
+                  <a:latin typeface="Roboto Light" panose="02000000000000000000" pitchFamily="2" charset="0"/>
+                  <a:ea typeface="Roboto Light" panose="02000000000000000000" pitchFamily="2" charset="0"/>
+                  <a:cs typeface="Roboto Light" panose="02000000000000000000" pitchFamily="2" charset="0"/>
+                </a:rPr>
+                <a:t>Concrete for a specific use case</a:t>
+              </a:r>
+            </a:p>
+            <a:p>
+              <a:pPr marL="285750" indent="-285750" algn="ctr">
+                <a:buFont typeface="Arial" panose="020B0604020202020204" pitchFamily="34" charset="0"/>
+                <a:buChar char="•"/>
+              </a:pPr>
+              <a:endParaRPr lang="en-GB" dirty="0">
+                <a:solidFill>
+                  <a:schemeClr val="tx1"/>
+                </a:solidFill>
+              </a:endParaRPr>
+            </a:p>
+          </p:txBody>
+        </p:sp>
+        <p:sp>
+          <p:nvSpPr>
+            <p:cNvPr id="9" name="Abgerundetes Rechteck 8"/>
+            <p:cNvSpPr/>
+            <p:nvPr/>
+          </p:nvSpPr>
+          <p:spPr>
+            <a:xfrm>
+              <a:off x="1932157" y="4440675"/>
+              <a:ext cx="1507787" cy="418289"/>
+            </a:xfrm>
+            <a:prstGeom prst="roundRect">
+              <a:avLst/>
+            </a:prstGeom>
             <a:solidFill>
-              <a:schemeClr val="accent1">
-                <a:lumMod val="50000"/>
+              <a:schemeClr val="bg1">
+                <a:lumMod val="85000"/>
               </a:schemeClr>
             </a:solidFill>
-          </a:ln>
-        </p:spPr>
-        <p:style>
-          <a:lnRef idx="2">
-            <a:schemeClr val="accent1">
-              <a:shade val="50000"/>
-            </a:schemeClr>
-          </a:lnRef>
-          <a:fillRef idx="1">
-            <a:schemeClr val="accent1"/>
-          </a:fillRef>
-          <a:effectRef idx="0">
-            <a:schemeClr val="accent1"/>
-          </a:effectRef>
-          <a:fontRef idx="minor">
-            <a:schemeClr val="lt1"/>
-          </a:fontRef>
-        </p:style>
-        <p:txBody>
-          <a:bodyPr rtlCol="0" anchor="ctr"/>
-          <a:lstStyle/>
-          <a:p>
-            <a:pPr marL="285750" indent="-285750">
-              <a:buFont typeface="Arial" panose="020B0604020202020204" pitchFamily="34" charset="0"/>
-              <a:buChar char="•"/>
-            </a:pPr>
-            <a:endParaRPr lang="en-GB" dirty="0" smtClean="0">
-              <a:solidFill>
-                <a:schemeClr val="tx1"/>
-              </a:solidFill>
-              <a:latin typeface="Roboto Light" panose="02000000000000000000" pitchFamily="2" charset="0"/>
-              <a:ea typeface="Roboto Light" panose="02000000000000000000" pitchFamily="2" charset="0"/>
-              <a:cs typeface="Roboto Light" panose="02000000000000000000" pitchFamily="2" charset="0"/>
-            </a:endParaRPr>
-          </a:p>
-          <a:p>
-            <a:pPr marL="285750" indent="-285750">
-              <a:buFont typeface="Arial" panose="020B0604020202020204" pitchFamily="34" charset="0"/>
-              <a:buChar char="•"/>
-            </a:pPr>
-            <a:r>
-              <a:rPr lang="en-GB" dirty="0" smtClean="0">
+            <a:ln>
+              <a:noFill/>
+            </a:ln>
+          </p:spPr>
+          <p:style>
+            <a:lnRef idx="2">
+              <a:schemeClr val="accent1">
+                <a:shade val="50000"/>
+              </a:schemeClr>
+            </a:lnRef>
+            <a:fillRef idx="1">
+              <a:schemeClr val="accent1"/>
+            </a:fillRef>
+            <a:effectRef idx="0">
+              <a:schemeClr val="accent1"/>
+            </a:effectRef>
+            <a:fontRef idx="minor">
+              <a:schemeClr val="lt1"/>
+            </a:fontRef>
+          </p:style>
+          <p:txBody>
+            <a:bodyPr rtlCol="0" anchor="ctr"/>
+            <a:lstStyle/>
+            <a:p>
+              <a:pPr algn="ctr"/>
+              <a:r>
+                <a:rPr lang="en-GB" b="1" dirty="0" smtClean="0">
+                  <a:solidFill>
+                    <a:schemeClr val="tx1"/>
+                  </a:solidFill>
+                  <a:latin typeface="Roboto Light" panose="02000000000000000000" pitchFamily="2" charset="0"/>
+                  <a:ea typeface="Roboto Light" panose="02000000000000000000" pitchFamily="2" charset="0"/>
+                  <a:cs typeface="Roboto Light" panose="02000000000000000000" pitchFamily="2" charset="0"/>
+                </a:rPr>
+                <a:t>basic</a:t>
+              </a:r>
+              <a:endParaRPr lang="en-GB" b="1" dirty="0">
                 <a:solidFill>
                   <a:schemeClr val="tx1"/>
                 </a:solidFill>
                 <a:latin typeface="Roboto Light" panose="02000000000000000000" pitchFamily="2" charset="0"/>
                 <a:ea typeface="Roboto Light" panose="02000000000000000000" pitchFamily="2" charset="0"/>
                 <a:cs typeface="Roboto Light" panose="02000000000000000000" pitchFamily="2" charset="0"/>
-              </a:rPr>
-              <a:t>specific</a:t>
-            </a:r>
-          </a:p>
-          <a:p>
-            <a:pPr marL="285750" indent="-285750">
-              <a:buFont typeface="Arial" panose="020B0604020202020204" pitchFamily="34" charset="0"/>
-              <a:buChar char="•"/>
-            </a:pPr>
-            <a:r>
-              <a:rPr lang="en-GB" dirty="0" smtClean="0">
+              </a:endParaRPr>
+            </a:p>
+          </p:txBody>
+        </p:sp>
+        <p:sp>
+          <p:nvSpPr>
+            <p:cNvPr id="14" name="Abgerundetes Rechteck 13"/>
+            <p:cNvSpPr/>
+            <p:nvPr/>
+          </p:nvSpPr>
+          <p:spPr>
+            <a:xfrm>
+              <a:off x="5912344" y="4440674"/>
+              <a:ext cx="1507787" cy="418289"/>
+            </a:xfrm>
+            <a:prstGeom prst="roundRect">
+              <a:avLst/>
+            </a:prstGeom>
+            <a:solidFill>
+              <a:schemeClr val="bg1">
+                <a:lumMod val="85000"/>
+              </a:schemeClr>
+            </a:solidFill>
+            <a:ln>
+              <a:noFill/>
+            </a:ln>
+          </p:spPr>
+          <p:style>
+            <a:lnRef idx="2">
+              <a:schemeClr val="accent1">
+                <a:shade val="50000"/>
+              </a:schemeClr>
+            </a:lnRef>
+            <a:fillRef idx="1">
+              <a:schemeClr val="accent1"/>
+            </a:fillRef>
+            <a:effectRef idx="0">
+              <a:schemeClr val="accent1"/>
+            </a:effectRef>
+            <a:fontRef idx="minor">
+              <a:schemeClr val="lt1"/>
+            </a:fontRef>
+          </p:style>
+          <p:txBody>
+            <a:bodyPr rtlCol="0" anchor="ctr"/>
+            <a:lstStyle/>
+            <a:p>
+              <a:pPr algn="ctr"/>
+              <a:r>
+                <a:rPr lang="en-GB" b="1" dirty="0" smtClean="0">
+                  <a:solidFill>
+                    <a:schemeClr val="tx1"/>
+                  </a:solidFill>
+                  <a:latin typeface="Roboto Light" panose="02000000000000000000" pitchFamily="2" charset="0"/>
+                  <a:ea typeface="Roboto Light" panose="02000000000000000000" pitchFamily="2" charset="0"/>
+                  <a:cs typeface="Roboto Light" panose="02000000000000000000" pitchFamily="2" charset="0"/>
+                </a:rPr>
+                <a:t>custom</a:t>
+              </a:r>
+              <a:endParaRPr lang="en-GB" b="1" dirty="0">
                 <a:solidFill>
                   <a:schemeClr val="tx1"/>
                 </a:solidFill>
                 <a:latin typeface="Roboto Light" panose="02000000000000000000" pitchFamily="2" charset="0"/>
                 <a:ea typeface="Roboto Light" panose="02000000000000000000" pitchFamily="2" charset="0"/>
                 <a:cs typeface="Roboto Light" panose="02000000000000000000" pitchFamily="2" charset="0"/>
-              </a:rPr>
-              <a:t>For users</a:t>
-            </a:r>
-          </a:p>
-          <a:p>
-            <a:pPr marL="285750" indent="-285750">
-              <a:buFont typeface="Arial" panose="020B0604020202020204" pitchFamily="34" charset="0"/>
-              <a:buChar char="•"/>
-            </a:pPr>
-            <a:r>
-              <a:rPr lang="en-GB" dirty="0" smtClean="0">
+              </a:endParaRPr>
+            </a:p>
+          </p:txBody>
+        </p:sp>
+        <p:sp>
+          <p:nvSpPr>
+            <p:cNvPr id="15" name="Abgerundetes Rechteck 14"/>
+            <p:cNvSpPr/>
+            <p:nvPr/>
+          </p:nvSpPr>
+          <p:spPr>
+            <a:xfrm>
+              <a:off x="3907479" y="4447158"/>
+              <a:ext cx="1507787" cy="418289"/>
+            </a:xfrm>
+            <a:prstGeom prst="roundRect">
+              <a:avLst/>
+            </a:prstGeom>
+            <a:solidFill>
+              <a:schemeClr val="bg1">
+                <a:lumMod val="85000"/>
+              </a:schemeClr>
+            </a:solidFill>
+            <a:ln>
+              <a:noFill/>
+            </a:ln>
+          </p:spPr>
+          <p:style>
+            <a:lnRef idx="2">
+              <a:schemeClr val="accent1">
+                <a:shade val="50000"/>
+              </a:schemeClr>
+            </a:lnRef>
+            <a:fillRef idx="1">
+              <a:schemeClr val="accent1"/>
+            </a:fillRef>
+            <a:effectRef idx="0">
+              <a:schemeClr val="accent1"/>
+            </a:effectRef>
+            <a:fontRef idx="minor">
+              <a:schemeClr val="lt1"/>
+            </a:fontRef>
+          </p:style>
+          <p:txBody>
+            <a:bodyPr rtlCol="0" anchor="ctr"/>
+            <a:lstStyle/>
+            <a:p>
+              <a:pPr algn="ctr"/>
+              <a:r>
+                <a:rPr lang="en-GB" b="1" dirty="0" smtClean="0">
+                  <a:solidFill>
+                    <a:schemeClr val="tx1"/>
+                  </a:solidFill>
+                  <a:latin typeface="Roboto Light" panose="02000000000000000000" pitchFamily="2" charset="0"/>
+                  <a:ea typeface="Roboto Light" panose="02000000000000000000" pitchFamily="2" charset="0"/>
+                  <a:cs typeface="Roboto Light" panose="02000000000000000000" pitchFamily="2" charset="0"/>
+                </a:rPr>
+                <a:t>components</a:t>
+              </a:r>
+              <a:endParaRPr lang="en-GB" b="1" dirty="0">
                 <a:solidFill>
                   <a:schemeClr val="tx1"/>
                 </a:solidFill>
                 <a:latin typeface="Roboto Light" panose="02000000000000000000" pitchFamily="2" charset="0"/>
                 <a:ea typeface="Roboto Light" panose="02000000000000000000" pitchFamily="2" charset="0"/>
                 <a:cs typeface="Roboto Light" panose="02000000000000000000" pitchFamily="2" charset="0"/>
-              </a:rPr>
-              <a:t>Concrete for a specific use case</a:t>
-            </a:r>
-          </a:p>
-          <a:p>
-            <a:pPr marL="285750" indent="-285750" algn="ctr">
-              <a:buFont typeface="Arial" panose="020B0604020202020204" pitchFamily="34" charset="0"/>
-              <a:buChar char="•"/>
-            </a:pPr>
-            <a:endParaRPr lang="en-GB" dirty="0">
-              <a:solidFill>
-                <a:schemeClr val="tx1"/>
-              </a:solidFill>
-            </a:endParaRPr>
-          </a:p>
-        </p:txBody>
-      </p:sp>
-      <p:sp>
-        <p:nvSpPr>
-          <p:cNvPr id="9" name="Abgerundetes Rechteck 8"/>
-          <p:cNvSpPr/>
-          <p:nvPr/>
-        </p:nvSpPr>
-        <p:spPr>
-          <a:xfrm>
-            <a:off x="1932157" y="4440675"/>
-            <a:ext cx="1507787" cy="418289"/>
-          </a:xfrm>
-          <a:prstGeom prst="roundRect">
-            <a:avLst/>
-          </a:prstGeom>
-          <a:solidFill>
-            <a:schemeClr val="bg1">
-              <a:lumMod val="85000"/>
-            </a:schemeClr>
-          </a:solidFill>
-          <a:ln>
+              </a:endParaRPr>
+            </a:p>
+          </p:txBody>
+        </p:sp>
+        <p:sp>
+          <p:nvSpPr>
+            <p:cNvPr id="10" name="Textfeld 9"/>
+            <p:cNvSpPr txBox="1"/>
+            <p:nvPr/>
+          </p:nvSpPr>
+          <p:spPr>
+            <a:xfrm>
+              <a:off x="2686051" y="5729591"/>
+              <a:ext cx="4378122" cy="300082"/>
+            </a:xfrm>
+            <a:prstGeom prst="rect">
+              <a:avLst/>
+            </a:prstGeom>
             <a:noFill/>
-          </a:ln>
-        </p:spPr>
-        <p:style>
-          <a:lnRef idx="2">
-            <a:schemeClr val="accent1">
-              <a:shade val="50000"/>
-            </a:schemeClr>
-          </a:lnRef>
-          <a:fillRef idx="1">
-            <a:schemeClr val="accent1"/>
-          </a:fillRef>
-          <a:effectRef idx="0">
-            <a:schemeClr val="accent1"/>
-          </a:effectRef>
-          <a:fontRef idx="minor">
-            <a:schemeClr val="lt1"/>
-          </a:fontRef>
-        </p:style>
-        <p:txBody>
-          <a:bodyPr rtlCol="0" anchor="ctr"/>
-          <a:lstStyle/>
-          <a:p>
-            <a:pPr algn="ctr"/>
-            <a:r>
-              <a:rPr lang="en-GB" b="1" dirty="0" smtClean="0">
-                <a:solidFill>
-                  <a:schemeClr val="tx1"/>
-                </a:solidFill>
+          </p:spPr>
+          <p:txBody>
+            <a:bodyPr wrap="none" rtlCol="0">
+              <a:spAutoFit/>
+            </a:bodyPr>
+            <a:lstStyle/>
+            <a:p>
+              <a:r>
+                <a:rPr lang="en-GB" dirty="0">
+                  <a:latin typeface="Roboto Light" panose="02000000000000000000" pitchFamily="2" charset="0"/>
+                  <a:ea typeface="Roboto Light" panose="02000000000000000000" pitchFamily="2" charset="0"/>
+                  <a:cs typeface="Roboto Light" panose="02000000000000000000" pitchFamily="2" charset="0"/>
+                </a:rPr>
+                <a:t>o</a:t>
+              </a:r>
+              <a:r>
+                <a:rPr lang="en-GB" dirty="0" smtClean="0">
+                  <a:latin typeface="Roboto Light" panose="02000000000000000000" pitchFamily="2" charset="0"/>
+                  <a:ea typeface="Roboto Light" panose="02000000000000000000" pitchFamily="2" charset="0"/>
+                  <a:cs typeface="Roboto Light" panose="02000000000000000000" pitchFamily="2" charset="0"/>
+                </a:rPr>
+                <a:t>wn elaboration,  © Reiner </a:t>
+              </a:r>
+              <a:r>
+                <a:rPr lang="en-GB" dirty="0" err="1" smtClean="0">
+                  <a:latin typeface="Roboto Light" panose="02000000000000000000" pitchFamily="2" charset="0"/>
+                  <a:ea typeface="Roboto Light" panose="02000000000000000000" pitchFamily="2" charset="0"/>
+                  <a:cs typeface="Roboto Light" panose="02000000000000000000" pitchFamily="2" charset="0"/>
+                </a:rPr>
+                <a:t>Lemoine</a:t>
+              </a:r>
+              <a:r>
+                <a:rPr lang="en-GB" dirty="0" smtClean="0">
+                  <a:latin typeface="Roboto Light" panose="02000000000000000000" pitchFamily="2" charset="0"/>
+                  <a:ea typeface="Roboto Light" panose="02000000000000000000" pitchFamily="2" charset="0"/>
+                  <a:cs typeface="Roboto Light" panose="02000000000000000000" pitchFamily="2" charset="0"/>
+                </a:rPr>
+                <a:t> Institut | CC BY 4.0 </a:t>
+              </a:r>
+              <a:endParaRPr lang="en-GB" dirty="0">
                 <a:latin typeface="Roboto Light" panose="02000000000000000000" pitchFamily="2" charset="0"/>
                 <a:ea typeface="Roboto Light" panose="02000000000000000000" pitchFamily="2" charset="0"/>
                 <a:cs typeface="Roboto Light" panose="02000000000000000000" pitchFamily="2" charset="0"/>
-              </a:rPr>
-              <a:t>basic</a:t>
-            </a:r>
-            <a:endParaRPr lang="en-GB" b="1" dirty="0">
-              <a:solidFill>
-                <a:schemeClr val="tx1"/>
-              </a:solidFill>
-              <a:latin typeface="Roboto Light" panose="02000000000000000000" pitchFamily="2" charset="0"/>
-              <a:ea typeface="Roboto Light" panose="02000000000000000000" pitchFamily="2" charset="0"/>
-              <a:cs typeface="Roboto Light" panose="02000000000000000000" pitchFamily="2" charset="0"/>
-            </a:endParaRPr>
-          </a:p>
-        </p:txBody>
-      </p:sp>
-      <p:sp>
-        <p:nvSpPr>
-          <p:cNvPr id="14" name="Abgerundetes Rechteck 13"/>
-          <p:cNvSpPr/>
-          <p:nvPr/>
-        </p:nvSpPr>
-        <p:spPr>
-          <a:xfrm>
-            <a:off x="5912344" y="4440674"/>
-            <a:ext cx="1507787" cy="418289"/>
-          </a:xfrm>
-          <a:prstGeom prst="roundRect">
-            <a:avLst/>
-          </a:prstGeom>
-          <a:solidFill>
-            <a:schemeClr val="bg1">
-              <a:lumMod val="85000"/>
-            </a:schemeClr>
-          </a:solidFill>
-          <a:ln>
-            <a:noFill/>
-          </a:ln>
-        </p:spPr>
-        <p:style>
-          <a:lnRef idx="2">
-            <a:schemeClr val="accent1">
-              <a:shade val="50000"/>
-            </a:schemeClr>
-          </a:lnRef>
-          <a:fillRef idx="1">
-            <a:schemeClr val="accent1"/>
-          </a:fillRef>
-          <a:effectRef idx="0">
-            <a:schemeClr val="accent1"/>
-          </a:effectRef>
-          <a:fontRef idx="minor">
-            <a:schemeClr val="lt1"/>
-          </a:fontRef>
-        </p:style>
-        <p:txBody>
-          <a:bodyPr rtlCol="0" anchor="ctr"/>
-          <a:lstStyle/>
-          <a:p>
-            <a:pPr algn="ctr"/>
-            <a:r>
-              <a:rPr lang="en-GB" b="1" dirty="0" smtClean="0">
-                <a:solidFill>
-                  <a:schemeClr val="tx1"/>
-                </a:solidFill>
-                <a:latin typeface="Roboto Light" panose="02000000000000000000" pitchFamily="2" charset="0"/>
-                <a:ea typeface="Roboto Light" panose="02000000000000000000" pitchFamily="2" charset="0"/>
-                <a:cs typeface="Roboto Light" panose="02000000000000000000" pitchFamily="2" charset="0"/>
-              </a:rPr>
-              <a:t>custom</a:t>
-            </a:r>
-            <a:endParaRPr lang="en-GB" b="1" dirty="0">
-              <a:solidFill>
-                <a:schemeClr val="tx1"/>
-              </a:solidFill>
-              <a:latin typeface="Roboto Light" panose="02000000000000000000" pitchFamily="2" charset="0"/>
-              <a:ea typeface="Roboto Light" panose="02000000000000000000" pitchFamily="2" charset="0"/>
-              <a:cs typeface="Roboto Light" panose="02000000000000000000" pitchFamily="2" charset="0"/>
-            </a:endParaRPr>
-          </a:p>
-        </p:txBody>
-      </p:sp>
-      <p:sp>
-        <p:nvSpPr>
-          <p:cNvPr id="15" name="Abgerundetes Rechteck 14"/>
-          <p:cNvSpPr/>
-          <p:nvPr/>
-        </p:nvSpPr>
-        <p:spPr>
-          <a:xfrm>
-            <a:off x="3907479" y="4447158"/>
-            <a:ext cx="1507787" cy="418289"/>
-          </a:xfrm>
-          <a:prstGeom prst="roundRect">
-            <a:avLst/>
-          </a:prstGeom>
-          <a:solidFill>
-            <a:schemeClr val="bg1">
-              <a:lumMod val="85000"/>
-            </a:schemeClr>
-          </a:solidFill>
-          <a:ln>
-            <a:noFill/>
-          </a:ln>
-        </p:spPr>
-        <p:style>
-          <a:lnRef idx="2">
-            <a:schemeClr val="accent1">
-              <a:shade val="50000"/>
-            </a:schemeClr>
-          </a:lnRef>
-          <a:fillRef idx="1">
-            <a:schemeClr val="accent1"/>
-          </a:fillRef>
-          <a:effectRef idx="0">
-            <a:schemeClr val="accent1"/>
-          </a:effectRef>
-          <a:fontRef idx="minor">
-            <a:schemeClr val="lt1"/>
-          </a:fontRef>
-        </p:style>
-        <p:txBody>
-          <a:bodyPr rtlCol="0" anchor="ctr"/>
-          <a:lstStyle/>
-          <a:p>
-            <a:pPr algn="ctr"/>
-            <a:r>
-              <a:rPr lang="en-GB" b="1" dirty="0" smtClean="0">
-                <a:solidFill>
-                  <a:schemeClr val="tx1"/>
-                </a:solidFill>
-                <a:latin typeface="Roboto Light" panose="02000000000000000000" pitchFamily="2" charset="0"/>
-                <a:ea typeface="Roboto Light" panose="02000000000000000000" pitchFamily="2" charset="0"/>
-                <a:cs typeface="Roboto Light" panose="02000000000000000000" pitchFamily="2" charset="0"/>
-              </a:rPr>
-              <a:t>components</a:t>
-            </a:r>
-            <a:endParaRPr lang="en-GB" b="1" dirty="0">
-              <a:solidFill>
-                <a:schemeClr val="tx1"/>
-              </a:solidFill>
-              <a:latin typeface="Roboto Light" panose="02000000000000000000" pitchFamily="2" charset="0"/>
-              <a:ea typeface="Roboto Light" panose="02000000000000000000" pitchFamily="2" charset="0"/>
-              <a:cs typeface="Roboto Light" panose="02000000000000000000" pitchFamily="2" charset="0"/>
-            </a:endParaRPr>
-          </a:p>
-        </p:txBody>
-      </p:sp>
+              </a:endParaRPr>
+            </a:p>
+          </p:txBody>
+        </p:sp>
+      </p:grpSp>
     </p:spTree>
     <p:extLst>
       <p:ext uri="{BB962C8B-B14F-4D97-AF65-F5344CB8AC3E}">
@@ -22524,7 +22811,19 @@
             <a:pPr lvl="1"/>
             <a:r>
               <a:rPr lang="en-GB" dirty="0" smtClean="0"/>
-              <a:t>Edge / Flow</a:t>
+              <a:t>Edge / </a:t>
+            </a:r>
+            <a:r>
+              <a:rPr lang="en-GB" dirty="0" smtClean="0"/>
+              <a:t>Flow (</a:t>
+            </a:r>
+            <a:r>
+              <a:rPr lang="en-GB" dirty="0" err="1" smtClean="0"/>
+              <a:t>oemof</a:t>
+            </a:r>
+            <a:r>
+              <a:rPr lang="en-GB" dirty="0" smtClean="0"/>
+              <a:t>)</a:t>
             </a:r>
             <a:endParaRPr lang="en-GB" dirty="0"/>
           </a:p>
@@ -22537,14 +22836,13 @@
           <a:p>
             <a:r>
               <a:rPr lang="en-GB" dirty="0" smtClean="0"/>
-              <a:t>Bus balance (example)</a:t>
-            </a:r>
-          </a:p>
-          <a:p>
+              <a:t>Bus balance (example</a:t>
+            </a:r>
             <a:r>
               <a:rPr lang="en-GB" dirty="0" smtClean="0"/>
-              <a:t>Parameterization mainly done within Flows</a:t>
-            </a:r>
+              <a:t>)</a:t>
+            </a:r>
+            <a:endParaRPr lang="en-GB" dirty="0" smtClean="0"/>
           </a:p>
         </p:txBody>
       </p:sp>
@@ -22581,6 +22879,13 @@
   <p:clrMapOvr>
     <a:masterClrMapping/>
   </p:clrMapOvr>
+  <p:timing>
+    <p:tnLst>
+      <p:par>
+        <p:cTn id="1" dur="indefinite" restart="never" nodeType="tmRoot"/>
+      </p:par>
+    </p:tnLst>
+  </p:timing>
 </p:sld>
 </file>
 
@@ -22618,11 +22923,7 @@
           <a:p>
             <a:r>
               <a:rPr lang="en-GB" dirty="0" smtClean="0"/>
-              <a:t>Overview Basic </a:t>
-            </a:r>
-            <a:r>
-              <a:rPr lang="en-GB" dirty="0" smtClean="0"/>
-              <a:t>Components</a:t>
+              <a:t>Overview Basic Components</a:t>
             </a:r>
             <a:endParaRPr lang="en-GB" dirty="0"/>
           </a:p>
@@ -22702,7 +23003,7 @@
             </a:pPr>
             <a:r>
               <a:rPr lang="en-GB" sz="2000" b="1" dirty="0" smtClean="0"/>
-              <a:t>Class: </a:t>
+              <a:t>Module: </a:t>
             </a:r>
             <a:r>
               <a:rPr lang="en-GB" sz="2000" dirty="0" err="1" smtClean="0"/>
@@ -22719,11 +23020,15 @@
               <a:t>API-Documentation: </a:t>
             </a:r>
             <a:r>
-              <a:rPr lang="en-GB" sz="2000" dirty="0"/>
+              <a:rPr lang="en-GB" sz="2000" dirty="0">
+                <a:hlinkClick r:id="rId2"/>
+              </a:rPr>
               <a:t>https://</a:t>
             </a:r>
             <a:r>
-              <a:rPr lang="en-GB" sz="2000" dirty="0" smtClean="0"/>
+              <a:rPr lang="en-GB" sz="2000" dirty="0" smtClean="0">
+                <a:hlinkClick r:id="rId2"/>
+              </a:rPr>
               <a:t>oemof.readthedocs.io/en/stable/api/oemof.solph.html#module-oemof.solph.network</a:t>
             </a:r>
             <a:endParaRPr lang="en-GB" sz="2000" dirty="0" smtClean="0"/>
@@ -22759,9 +23064,15 @@
             </a:pPr>
             <a:r>
               <a:rPr lang="en-GB" sz="2000" dirty="0">
-                <a:hlinkClick r:id="rId2"/>
+                <a:hlinkClick r:id="rId3"/>
               </a:rPr>
-              <a:t>https://github.com/smartie2076/oemof_workshop/tree/master/Day_2_Components_Oemof/3_3_oemof_component_models_oemof_solph.ipynb</a:t>
+              <a:t>https://</a:t>
+            </a:r>
+            <a:r>
+              <a:rPr lang="en-GB" sz="2000" dirty="0" smtClean="0">
+                <a:hlinkClick r:id="rId3"/>
+              </a:rPr>
+              <a:t>github.com/smartie2076/oemof_workshop/tree/master/Day_2_Components_Oemof/03_oemof_basic_component.ipynb</a:t>
             </a:r>
             <a:endParaRPr lang="en-GB" sz="2000" dirty="0"/>
           </a:p>
@@ -22955,12 +23266,12 @@
           <a:p>
             <a:pPr algn="ctr"/>
             <a:r>
-              <a:rPr lang="en-GB" sz="2400" dirty="0" err="1" smtClean="0">
+              <a:rPr lang="en-GB" sz="2400" dirty="0" smtClean="0">
                 <a:latin typeface="Roboto Light" panose="02000000000000000000" pitchFamily="2" charset="0"/>
                 <a:ea typeface="Roboto Light" panose="02000000000000000000" pitchFamily="2" charset="0"/>
                 <a:cs typeface="Roboto Light" panose="02000000000000000000" pitchFamily="2" charset="0"/>
               </a:rPr>
-              <a:t>Transfomer</a:t>
+              <a:t>Transformer</a:t>
             </a:r>
             <a:endParaRPr lang="en-GB" sz="2400" dirty="0">
               <a:latin typeface="Roboto Light" panose="02000000000000000000" pitchFamily="2" charset="0"/>
@@ -22980,6 +23291,13 @@
   <p:clrMapOvr>
     <a:masterClrMapping/>
   </p:clrMapOvr>
+  <p:timing>
+    <p:tnLst>
+      <p:par>
+        <p:cTn id="1" dur="indefinite" restart="never" nodeType="tmRoot"/>
+      </p:par>
+    </p:tnLst>
+  </p:timing>
 </p:sld>
 </file>
 
@@ -23017,11 +23335,7 @@
           <a:p>
             <a:r>
               <a:rPr lang="en-GB" dirty="0" smtClean="0"/>
-              <a:t>Overview </a:t>
-            </a:r>
-            <a:r>
-              <a:rPr lang="en-GB" dirty="0" smtClean="0"/>
-              <a:t>Components</a:t>
+              <a:t>Overview Components</a:t>
             </a:r>
             <a:endParaRPr lang="en-GB" dirty="0"/>
           </a:p>
@@ -23163,7 +23477,7 @@
         </p:nvSpPr>
         <p:spPr>
           <a:xfrm>
-            <a:off x="1001948" y="2740866"/>
+            <a:off x="1001948" y="2765351"/>
             <a:ext cx="3271737" cy="820265"/>
           </a:xfrm>
           <a:prstGeom prst="roundRect">
@@ -23221,7 +23535,7 @@
         </p:nvSpPr>
         <p:spPr>
           <a:xfrm>
-            <a:off x="1001949" y="3970567"/>
+            <a:off x="1001949" y="3983994"/>
             <a:ext cx="3271737" cy="820265"/>
           </a:xfrm>
           <a:prstGeom prst="roundRect">
@@ -23356,7 +23670,7 @@
             </a:pPr>
             <a:r>
               <a:rPr lang="en-GB" sz="2000" b="1" dirty="0" smtClean="0"/>
-              <a:t>Class: </a:t>
+              <a:t>Module: </a:t>
             </a:r>
             <a:r>
               <a:rPr lang="en-GB" sz="2000" dirty="0" err="1" smtClean="0"/>
@@ -23383,9 +23697,12 @@
               <a:t>: </a:t>
             </a:r>
             <a:r>
-              <a:rPr lang="en-GB" sz="2000" dirty="0"/>
+              <a:rPr lang="en-GB" sz="2000" dirty="0">
+                <a:hlinkClick r:id="rId2"/>
+              </a:rPr>
               <a:t>https://oemof.readthedocs.io/en/stable/api/oemof.solph.html#module-oemof.solph.components</a:t>
             </a:r>
+            <a:endParaRPr lang="en-GB" sz="2000" dirty="0"/>
           </a:p>
           <a:p>
             <a:pPr marL="0" indent="0">
@@ -23405,6 +23722,13 @@
   <p:clrMapOvr>
     <a:masterClrMapping/>
   </p:clrMapOvr>
+  <p:timing>
+    <p:tnLst>
+      <p:par>
+        <p:cTn id="1" dur="indefinite" restart="never" nodeType="tmRoot"/>
+      </p:par>
+    </p:tnLst>
+  </p:timing>
 </p:sld>
 </file>
 
@@ -23663,7 +23987,7 @@
   <a:extraClrSchemeLst/>
   <a:extLst>
     <a:ext uri="{05A4C25C-085E-4340-85A3-A5531E510DB2}">
-      <thm15:themeFamily xmlns="" xmlns:thm15="http://schemas.microsoft.com/office/thememl/2012/main" name="Temp_4_3" id="{FBB040BC-78F6-8047-8D44-08711A1B9F84}" vid="{E7A8DE59-E638-5942-AB3F-922B1F06AE2C}"/>
+      <thm15:themeFamily xmlns:thm15="http://schemas.microsoft.com/office/thememl/2012/main" xmlns="" name="Temp_4_3" id="{FBB040BC-78F6-8047-8D44-08711A1B9F84}" vid="{E7A8DE59-E638-5942-AB3F-922B1F06AE2C}"/>
     </a:ext>
   </a:extLst>
 </a:theme>
@@ -23924,7 +24248,7 @@
   <a:extraClrSchemeLst/>
   <a:extLst>
     <a:ext uri="{05A4C25C-085E-4340-85A3-A5531E510DB2}">
-      <thm15:themeFamily xmlns="" xmlns:thm15="http://schemas.microsoft.com/office/thememl/2012/main" name="Office Theme" id="{62F939B6-93AF-4DB8-9C6B-D6C7DFDC589F}" vid="{4A3C46E8-61CC-4603-A589-7422A47A8E4A}"/>
+      <thm15:themeFamily xmlns:thm15="http://schemas.microsoft.com/office/thememl/2012/main" xmlns="" name="Office Theme" id="{62F939B6-93AF-4DB8-9C6B-D6C7DFDC589F}" vid="{4A3C46E8-61CC-4603-A589-7422A47A8E4A}"/>
     </a:ext>
   </a:extLst>
 </a:theme>

</xml_diff>